<commit_message>
system architecture annd summary added
</commit_message>
<xml_diff>
--- a/diagrams/diagram_4.pptx
+++ b/diagrams/diagram_4.pptx
@@ -104,6 +104,11 @@
       </a:defRPr>
     </a:lvl9pPr>
   </p:defaultTextStyle>
+  <p:extLst>
+    <p:ext uri="{EFAFB233-063F-42B5-8137-9DF3F51BA10A}">
+      <p15:sldGuideLst xmlns:p15="http://schemas.microsoft.com/office/powerpoint/2012/main"/>
+    </p:ext>
+  </p:extLst>
 </p:presentation>
 </file>
 
@@ -254,7 +259,7 @@
           <a:p>
             <a:fld id="{2E1C58D0-B5F7-43EB-8E91-7671306A5A95}" type="datetimeFigureOut">
               <a:rPr lang="en-US" smtClean="0"/>
-              <a:t>9/29/2019</a:t>
+              <a:t>9/30/2019</a:t>
             </a:fld>
             <a:endParaRPr lang="en-US"/>
           </a:p>
@@ -452,7 +457,7 @@
           <a:p>
             <a:fld id="{2E1C58D0-B5F7-43EB-8E91-7671306A5A95}" type="datetimeFigureOut">
               <a:rPr lang="en-US" smtClean="0"/>
-              <a:t>9/29/2019</a:t>
+              <a:t>9/30/2019</a:t>
             </a:fld>
             <a:endParaRPr lang="en-US"/>
           </a:p>
@@ -660,7 +665,7 @@
           <a:p>
             <a:fld id="{2E1C58D0-B5F7-43EB-8E91-7671306A5A95}" type="datetimeFigureOut">
               <a:rPr lang="en-US" smtClean="0"/>
-              <a:t>9/29/2019</a:t>
+              <a:t>9/30/2019</a:t>
             </a:fld>
             <a:endParaRPr lang="en-US"/>
           </a:p>
@@ -858,7 +863,7 @@
           <a:p>
             <a:fld id="{2E1C58D0-B5F7-43EB-8E91-7671306A5A95}" type="datetimeFigureOut">
               <a:rPr lang="en-US" smtClean="0"/>
-              <a:t>9/29/2019</a:t>
+              <a:t>9/30/2019</a:t>
             </a:fld>
             <a:endParaRPr lang="en-US"/>
           </a:p>
@@ -1133,7 +1138,7 @@
           <a:p>
             <a:fld id="{2E1C58D0-B5F7-43EB-8E91-7671306A5A95}" type="datetimeFigureOut">
               <a:rPr lang="en-US" smtClean="0"/>
-              <a:t>9/29/2019</a:t>
+              <a:t>9/30/2019</a:t>
             </a:fld>
             <a:endParaRPr lang="en-US"/>
           </a:p>
@@ -1398,7 +1403,7 @@
           <a:p>
             <a:fld id="{2E1C58D0-B5F7-43EB-8E91-7671306A5A95}" type="datetimeFigureOut">
               <a:rPr lang="en-US" smtClean="0"/>
-              <a:t>9/29/2019</a:t>
+              <a:t>9/30/2019</a:t>
             </a:fld>
             <a:endParaRPr lang="en-US"/>
           </a:p>
@@ -1810,7 +1815,7 @@
           <a:p>
             <a:fld id="{2E1C58D0-B5F7-43EB-8E91-7671306A5A95}" type="datetimeFigureOut">
               <a:rPr lang="en-US" smtClean="0"/>
-              <a:t>9/29/2019</a:t>
+              <a:t>9/30/2019</a:t>
             </a:fld>
             <a:endParaRPr lang="en-US"/>
           </a:p>
@@ -1951,7 +1956,7 @@
           <a:p>
             <a:fld id="{2E1C58D0-B5F7-43EB-8E91-7671306A5A95}" type="datetimeFigureOut">
               <a:rPr lang="en-US" smtClean="0"/>
-              <a:t>9/29/2019</a:t>
+              <a:t>9/30/2019</a:t>
             </a:fld>
             <a:endParaRPr lang="en-US"/>
           </a:p>
@@ -2064,7 +2069,7 @@
           <a:p>
             <a:fld id="{2E1C58D0-B5F7-43EB-8E91-7671306A5A95}" type="datetimeFigureOut">
               <a:rPr lang="en-US" smtClean="0"/>
-              <a:t>9/29/2019</a:t>
+              <a:t>9/30/2019</a:t>
             </a:fld>
             <a:endParaRPr lang="en-US"/>
           </a:p>
@@ -2375,7 +2380,7 @@
           <a:p>
             <a:fld id="{2E1C58D0-B5F7-43EB-8E91-7671306A5A95}" type="datetimeFigureOut">
               <a:rPr lang="en-US" smtClean="0"/>
-              <a:t>9/29/2019</a:t>
+              <a:t>9/30/2019</a:t>
             </a:fld>
             <a:endParaRPr lang="en-US"/>
           </a:p>
@@ -2663,7 +2668,7 @@
           <a:p>
             <a:fld id="{2E1C58D0-B5F7-43EB-8E91-7671306A5A95}" type="datetimeFigureOut">
               <a:rPr lang="en-US" smtClean="0"/>
-              <a:t>9/29/2019</a:t>
+              <a:t>9/30/2019</a:t>
             </a:fld>
             <a:endParaRPr lang="en-US"/>
           </a:p>
@@ -2904,7 +2909,7 @@
           <a:p>
             <a:fld id="{2E1C58D0-B5F7-43EB-8E91-7671306A5A95}" type="datetimeFigureOut">
               <a:rPr lang="en-US" smtClean="0"/>
-              <a:t>9/29/2019</a:t>
+              <a:t>9/30/2019</a:t>
             </a:fld>
             <a:endParaRPr lang="en-US"/>
           </a:p>
@@ -3355,43 +3360,6 @@
           </a:prstGeom>
         </p:spPr>
       </p:pic>
-      <p:sp>
-        <p:nvSpPr>
-          <p:cNvPr id="5" name="TextBox 4">
-            <a:extLst>
-              <a:ext uri="{FF2B5EF4-FFF2-40B4-BE49-F238E27FC236}">
-                <a16:creationId xmlns:a16="http://schemas.microsoft.com/office/drawing/2014/main" id="{B3B43B61-5EC1-418F-9202-A0F946744816}"/>
-              </a:ext>
-            </a:extLst>
-          </p:cNvPr>
-          <p:cNvSpPr txBox="1"/>
-          <p:nvPr/>
-        </p:nvSpPr>
-        <p:spPr>
-          <a:xfrm>
-            <a:off x="4763911" y="203200"/>
-            <a:ext cx="2901244" cy="523220"/>
-          </a:xfrm>
-          <a:prstGeom prst="rect">
-            <a:avLst/>
-          </a:prstGeom>
-          <a:noFill/>
-        </p:spPr>
-        <p:txBody>
-          <a:bodyPr wrap="square" rtlCol="0">
-            <a:spAutoFit/>
-          </a:bodyPr>
-          <a:lstStyle/>
-          <a:p>
-            <a:pPr algn="ctr"/>
-            <a:r>
-              <a:rPr lang="en-US" sz="2800" dirty="0"/>
-              <a:t>Diagram 4</a:t>
-            </a:r>
-            <a:endParaRPr lang="en-US" dirty="0"/>
-          </a:p>
-        </p:txBody>
-      </p:sp>
     </p:spTree>
     <p:extLst>
       <p:ext uri="{BB962C8B-B14F-4D97-AF65-F5344CB8AC3E}">

</xml_diff>